<commit_message>
aclosure and addTo now used StackedLocation
</commit_message>
<xml_diff>
--- a/tekeningen combinatoren.pptx
+++ b/tekeningen combinatoren.pptx
@@ -14,6 +14,7 @@
     <p:sldId id="262" r:id="rId8"/>
     <p:sldId id="263" r:id="rId9"/>
     <p:sldId id="264" r:id="rId10"/>
+    <p:sldId id="265" r:id="rId11"/>
   </p:sldIdLst>
   <p:sldSz cx="12192000" cy="6858000"/>
   <p:notesSz cx="6858000" cy="9144000"/>
@@ -3023,6 +3024,1014 @@
 </p:sld>
 </file>
 
+<file path=ppt/slides/slide10.xml><?xml version="1.0" encoding="utf-8"?>
+<p:sld xmlns:a="http://schemas.openxmlformats.org/drawingml/2006/main" xmlns:r="http://schemas.openxmlformats.org/officeDocument/2006/relationships" xmlns:p="http://schemas.openxmlformats.org/presentationml/2006/main">
+  <p:cSld>
+    <p:spTree>
+      <p:nvGrpSpPr>
+        <p:cNvPr id="1" name=""/>
+        <p:cNvGrpSpPr/>
+        <p:nvPr/>
+      </p:nvGrpSpPr>
+      <p:grpSpPr>
+        <a:xfrm>
+          <a:off x="0" y="0"/>
+          <a:ext cx="0" cy="0"/>
+          <a:chOff x="0" y="0"/>
+          <a:chExt cx="0" cy="0"/>
+        </a:xfrm>
+      </p:grpSpPr>
+      <p:sp>
+        <p:nvSpPr>
+          <p:cNvPr id="11" name="Ovaal 10"/>
+          <p:cNvSpPr/>
+          <p:nvPr/>
+        </p:nvSpPr>
+        <p:spPr>
+          <a:xfrm>
+            <a:off x="1837522" y="2800496"/>
+            <a:ext cx="534256" cy="513707"/>
+          </a:xfrm>
+          <a:prstGeom prst="ellipse">
+            <a:avLst/>
+          </a:prstGeom>
+        </p:spPr>
+        <p:style>
+          <a:lnRef idx="2">
+            <a:schemeClr val="accent6"/>
+          </a:lnRef>
+          <a:fillRef idx="1">
+            <a:schemeClr val="lt1"/>
+          </a:fillRef>
+          <a:effectRef idx="0">
+            <a:schemeClr val="accent6"/>
+          </a:effectRef>
+          <a:fontRef idx="minor">
+            <a:schemeClr val="dk1"/>
+          </a:fontRef>
+        </p:style>
+        <p:txBody>
+          <a:bodyPr lIns="36000" rIns="36000" rtlCol="0" anchor="ctr"/>
+          <a:lstStyle/>
+          <a:p>
+            <a:pPr algn="ctr"/>
+            <a:r>
+              <a:rPr lang="nl-NL" sz="1000" dirty="0" smtClean="0"/>
+              <a:t>a</a:t>
+            </a:r>
+            <a:endParaRPr lang="nl-NL" sz="1000" dirty="0"/>
+          </a:p>
+        </p:txBody>
+      </p:sp>
+      <p:sp>
+        <p:nvSpPr>
+          <p:cNvPr id="38" name="Ovaal 37"/>
+          <p:cNvSpPr/>
+          <p:nvPr/>
+        </p:nvSpPr>
+        <p:spPr>
+          <a:xfrm>
+            <a:off x="1522812" y="4639860"/>
+            <a:ext cx="1163675" cy="513707"/>
+          </a:xfrm>
+          <a:prstGeom prst="ellipse">
+            <a:avLst/>
+          </a:prstGeom>
+        </p:spPr>
+        <p:style>
+          <a:lnRef idx="2">
+            <a:schemeClr val="accent6"/>
+          </a:lnRef>
+          <a:fillRef idx="1">
+            <a:schemeClr val="lt1"/>
+          </a:fillRef>
+          <a:effectRef idx="0">
+            <a:schemeClr val="accent6"/>
+          </a:effectRef>
+          <a:fontRef idx="minor">
+            <a:schemeClr val="dk1"/>
+          </a:fontRef>
+        </p:style>
+        <p:txBody>
+          <a:bodyPr rtlCol="0" anchor="ctr"/>
+          <a:lstStyle/>
+          <a:p>
+            <a:pPr algn="ctr"/>
+            <a:r>
+              <a:rPr lang="nl-NL" sz="1000" dirty="0" smtClean="0"/>
+              <a:t>[ f a, f (f a)]</a:t>
+            </a:r>
+            <a:endParaRPr lang="nl-NL" sz="1000" dirty="0"/>
+          </a:p>
+        </p:txBody>
+      </p:sp>
+      <p:sp>
+        <p:nvSpPr>
+          <p:cNvPr id="41" name="Tekstvak 40"/>
+          <p:cNvSpPr txBox="1"/>
+          <p:nvPr/>
+        </p:nvSpPr>
+        <p:spPr>
+          <a:xfrm>
+            <a:off x="2589988" y="5030454"/>
+            <a:ext cx="760144" cy="246221"/>
+          </a:xfrm>
+          <a:prstGeom prst="rect">
+            <a:avLst/>
+          </a:prstGeom>
+          <a:noFill/>
+        </p:spPr>
+        <p:txBody>
+          <a:bodyPr wrap="none" rtlCol="0">
+            <a:spAutoFit/>
+          </a:bodyPr>
+          <a:lstStyle/>
+          <a:p>
+            <a:r>
+              <a:rPr lang="nl-NL" sz="1000" dirty="0" err="1"/>
+              <a:t>m</a:t>
+            </a:r>
+            <a:r>
+              <a:rPr lang="nl-NL" sz="1000" dirty="0" err="1" smtClean="0"/>
+              <a:t>cons</a:t>
+            </a:r>
+            <a:r>
+              <a:rPr lang="nl-NL" sz="1000" dirty="0" smtClean="0"/>
+              <a:t> (f a)</a:t>
+            </a:r>
+            <a:endParaRPr lang="nl-NL" sz="1000" dirty="0"/>
+          </a:p>
+        </p:txBody>
+      </p:sp>
+      <p:sp>
+        <p:nvSpPr>
+          <p:cNvPr id="40" name="Ovaal 39"/>
+          <p:cNvSpPr/>
+          <p:nvPr/>
+        </p:nvSpPr>
+        <p:spPr>
+          <a:xfrm>
+            <a:off x="3582292" y="2800495"/>
+            <a:ext cx="534256" cy="513707"/>
+          </a:xfrm>
+          <a:prstGeom prst="ellipse">
+            <a:avLst/>
+          </a:prstGeom>
+        </p:spPr>
+        <p:style>
+          <a:lnRef idx="2">
+            <a:schemeClr val="accent6"/>
+          </a:lnRef>
+          <a:fillRef idx="1">
+            <a:schemeClr val="lt1"/>
+          </a:fillRef>
+          <a:effectRef idx="0">
+            <a:schemeClr val="accent6"/>
+          </a:effectRef>
+          <a:fontRef idx="minor">
+            <a:schemeClr val="dk1"/>
+          </a:fontRef>
+        </p:style>
+        <p:txBody>
+          <a:bodyPr lIns="36000" rIns="36000" rtlCol="0" anchor="ctr"/>
+          <a:lstStyle/>
+          <a:p>
+            <a:pPr algn="ctr"/>
+            <a:r>
+              <a:rPr lang="nl-NL" sz="1000" dirty="0"/>
+              <a:t>f</a:t>
+            </a:r>
+            <a:r>
+              <a:rPr lang="nl-NL" sz="1000" dirty="0" smtClean="0"/>
+              <a:t> a</a:t>
+            </a:r>
+            <a:endParaRPr lang="nl-NL" sz="1000" dirty="0"/>
+          </a:p>
+        </p:txBody>
+      </p:sp>
+      <p:sp>
+        <p:nvSpPr>
+          <p:cNvPr id="42" name="Ovaal 41"/>
+          <p:cNvSpPr/>
+          <p:nvPr/>
+        </p:nvSpPr>
+        <p:spPr>
+          <a:xfrm>
+            <a:off x="3267582" y="4639859"/>
+            <a:ext cx="1163675" cy="513707"/>
+          </a:xfrm>
+          <a:prstGeom prst="ellipse">
+            <a:avLst/>
+          </a:prstGeom>
+        </p:spPr>
+        <p:style>
+          <a:lnRef idx="2">
+            <a:schemeClr val="accent6"/>
+          </a:lnRef>
+          <a:fillRef idx="1">
+            <a:schemeClr val="lt1"/>
+          </a:fillRef>
+          <a:effectRef idx="0">
+            <a:schemeClr val="accent6"/>
+          </a:effectRef>
+          <a:fontRef idx="minor">
+            <a:schemeClr val="dk1"/>
+          </a:fontRef>
+        </p:style>
+        <p:txBody>
+          <a:bodyPr rtlCol="0" anchor="ctr"/>
+          <a:lstStyle/>
+          <a:p>
+            <a:pPr algn="ctr"/>
+            <a:r>
+              <a:rPr lang="nl-NL" sz="1000" dirty="0" smtClean="0"/>
+              <a:t>[f (f a)]</a:t>
+            </a:r>
+            <a:endParaRPr lang="nl-NL" sz="1000" dirty="0"/>
+          </a:p>
+        </p:txBody>
+      </p:sp>
+      <p:cxnSp>
+        <p:nvCxnSpPr>
+          <p:cNvPr id="46" name="Rechte verbindingslijn met pijl 45"/>
+          <p:cNvCxnSpPr>
+            <a:stCxn id="40" idx="4"/>
+            <a:endCxn id="42" idx="0"/>
+          </p:cNvCxnSpPr>
+          <p:nvPr/>
+        </p:nvCxnSpPr>
+        <p:spPr>
+          <a:xfrm>
+            <a:off x="3849420" y="3314202"/>
+            <a:ext cx="0" cy="1325657"/>
+          </a:xfrm>
+          <a:prstGeom prst="straightConnector1">
+            <a:avLst/>
+          </a:prstGeom>
+          <a:ln w="19050">
+            <a:tailEnd type="triangle"/>
+          </a:ln>
+        </p:spPr>
+        <p:style>
+          <a:lnRef idx="1">
+            <a:schemeClr val="accent1"/>
+          </a:lnRef>
+          <a:fillRef idx="0">
+            <a:schemeClr val="accent1"/>
+          </a:fillRef>
+          <a:effectRef idx="0">
+            <a:schemeClr val="accent1"/>
+          </a:effectRef>
+          <a:fontRef idx="minor">
+            <a:schemeClr val="tx1"/>
+          </a:fontRef>
+        </p:style>
+      </p:cxnSp>
+      <p:sp>
+        <p:nvSpPr>
+          <p:cNvPr id="55" name="Tekstvak 54"/>
+          <p:cNvSpPr txBox="1"/>
+          <p:nvPr/>
+        </p:nvSpPr>
+        <p:spPr>
+          <a:xfrm>
+            <a:off x="2862223" y="3742415"/>
+            <a:ext cx="957313" cy="246221"/>
+          </a:xfrm>
+          <a:prstGeom prst="rect">
+            <a:avLst/>
+          </a:prstGeom>
+          <a:noFill/>
+        </p:spPr>
+        <p:txBody>
+          <a:bodyPr wrap="none" rtlCol="0">
+            <a:spAutoFit/>
+          </a:bodyPr>
+          <a:lstStyle/>
+          <a:p>
+            <a:r>
+              <a:rPr lang="nl-NL" sz="1000" dirty="0"/>
+              <a:t>b</a:t>
+            </a:r>
+            <a:r>
+              <a:rPr lang="nl-NL" sz="1000" smtClean="0"/>
+              <a:t>ind </a:t>
+            </a:r>
+            <a:r>
+              <a:rPr lang="nl-NL" sz="1000" dirty="0" smtClean="0"/>
+              <a:t>(Just (f a))</a:t>
+            </a:r>
+            <a:endParaRPr lang="nl-NL" sz="1000" dirty="0"/>
+          </a:p>
+        </p:txBody>
+      </p:sp>
+      <p:cxnSp>
+        <p:nvCxnSpPr>
+          <p:cNvPr id="59" name="Rechte verbindingslijn met pijl 58"/>
+          <p:cNvCxnSpPr>
+            <a:stCxn id="11" idx="6"/>
+            <a:endCxn id="40" idx="2"/>
+          </p:cNvCxnSpPr>
+          <p:nvPr/>
+        </p:nvCxnSpPr>
+        <p:spPr>
+          <a:xfrm flipV="1">
+            <a:off x="2371778" y="3057349"/>
+            <a:ext cx="1210514" cy="1"/>
+          </a:xfrm>
+          <a:prstGeom prst="straightConnector1">
+            <a:avLst/>
+          </a:prstGeom>
+          <a:ln w="19050">
+            <a:tailEnd type="triangle"/>
+          </a:ln>
+        </p:spPr>
+        <p:style>
+          <a:lnRef idx="1">
+            <a:schemeClr val="accent1"/>
+          </a:lnRef>
+          <a:fillRef idx="0">
+            <a:schemeClr val="accent1"/>
+          </a:fillRef>
+          <a:effectRef idx="0">
+            <a:schemeClr val="accent1"/>
+          </a:effectRef>
+          <a:fontRef idx="minor">
+            <a:schemeClr val="tx1"/>
+          </a:fontRef>
+        </p:style>
+      </p:cxnSp>
+      <p:sp>
+        <p:nvSpPr>
+          <p:cNvPr id="60" name="Tekstvak 59"/>
+          <p:cNvSpPr txBox="1"/>
+          <p:nvPr/>
+        </p:nvSpPr>
+        <p:spPr>
+          <a:xfrm>
+            <a:off x="2982873" y="2750919"/>
+            <a:ext cx="223138" cy="246221"/>
+          </a:xfrm>
+          <a:prstGeom prst="rect">
+            <a:avLst/>
+          </a:prstGeom>
+          <a:noFill/>
+        </p:spPr>
+        <p:txBody>
+          <a:bodyPr wrap="none" rtlCol="0">
+            <a:spAutoFit/>
+          </a:bodyPr>
+          <a:lstStyle/>
+          <a:p>
+            <a:r>
+              <a:rPr lang="nl-NL" sz="1000" dirty="0" smtClean="0"/>
+              <a:t>f</a:t>
+            </a:r>
+            <a:endParaRPr lang="nl-NL" sz="1000" dirty="0"/>
+          </a:p>
+        </p:txBody>
+      </p:sp>
+      <p:cxnSp>
+        <p:nvCxnSpPr>
+          <p:cNvPr id="61" name="Rechte verbindingslijn met pijl 60"/>
+          <p:cNvCxnSpPr>
+            <a:stCxn id="42" idx="2"/>
+            <a:endCxn id="38" idx="6"/>
+          </p:cNvCxnSpPr>
+          <p:nvPr/>
+        </p:nvCxnSpPr>
+        <p:spPr>
+          <a:xfrm flipH="1">
+            <a:off x="2686487" y="4896713"/>
+            <a:ext cx="581095" cy="1"/>
+          </a:xfrm>
+          <a:prstGeom prst="straightConnector1">
+            <a:avLst/>
+          </a:prstGeom>
+          <a:ln w="19050">
+            <a:tailEnd type="triangle"/>
+          </a:ln>
+        </p:spPr>
+        <p:style>
+          <a:lnRef idx="1">
+            <a:schemeClr val="accent1"/>
+          </a:lnRef>
+          <a:fillRef idx="0">
+            <a:schemeClr val="accent1"/>
+          </a:fillRef>
+          <a:effectRef idx="0">
+            <a:schemeClr val="accent1"/>
+          </a:effectRef>
+          <a:fontRef idx="minor">
+            <a:schemeClr val="tx1"/>
+          </a:fontRef>
+        </p:style>
+      </p:cxnSp>
+      <p:sp>
+        <p:nvSpPr>
+          <p:cNvPr id="62" name="Ovaal 61"/>
+          <p:cNvSpPr/>
+          <p:nvPr/>
+        </p:nvSpPr>
+        <p:spPr>
+          <a:xfrm>
+            <a:off x="6336173" y="2800495"/>
+            <a:ext cx="716366" cy="513707"/>
+          </a:xfrm>
+          <a:prstGeom prst="ellipse">
+            <a:avLst/>
+          </a:prstGeom>
+        </p:spPr>
+        <p:style>
+          <a:lnRef idx="2">
+            <a:schemeClr val="accent6"/>
+          </a:lnRef>
+          <a:fillRef idx="1">
+            <a:schemeClr val="lt1"/>
+          </a:fillRef>
+          <a:effectRef idx="0">
+            <a:schemeClr val="accent6"/>
+          </a:effectRef>
+          <a:fontRef idx="minor">
+            <a:schemeClr val="dk1"/>
+          </a:fontRef>
+        </p:style>
+        <p:txBody>
+          <a:bodyPr lIns="36000" rIns="36000" rtlCol="0" anchor="ctr"/>
+          <a:lstStyle/>
+          <a:p>
+            <a:pPr algn="ctr"/>
+            <a:r>
+              <a:rPr lang="nl-NL" sz="1000" smtClean="0"/>
+              <a:t>Nothing</a:t>
+            </a:r>
+            <a:endParaRPr lang="nl-NL" sz="1000" dirty="0"/>
+          </a:p>
+        </p:txBody>
+      </p:sp>
+      <p:sp>
+        <p:nvSpPr>
+          <p:cNvPr id="63" name="Ovaal 62"/>
+          <p:cNvSpPr/>
+          <p:nvPr/>
+        </p:nvSpPr>
+        <p:spPr>
+          <a:xfrm>
+            <a:off x="5025540" y="4632315"/>
+            <a:ext cx="577643" cy="513707"/>
+          </a:xfrm>
+          <a:prstGeom prst="ellipse">
+            <a:avLst/>
+          </a:prstGeom>
+        </p:spPr>
+        <p:style>
+          <a:lnRef idx="2">
+            <a:schemeClr val="accent6"/>
+          </a:lnRef>
+          <a:fillRef idx="1">
+            <a:schemeClr val="lt1"/>
+          </a:fillRef>
+          <a:effectRef idx="0">
+            <a:schemeClr val="accent6"/>
+          </a:effectRef>
+          <a:fontRef idx="minor">
+            <a:schemeClr val="dk1"/>
+          </a:fontRef>
+        </p:style>
+        <p:txBody>
+          <a:bodyPr rtlCol="0" anchor="ctr"/>
+          <a:lstStyle/>
+          <a:p>
+            <a:pPr algn="ctr"/>
+            <a:r>
+              <a:rPr lang="nl-NL" sz="1000" dirty="0" smtClean="0"/>
+              <a:t>[]</a:t>
+            </a:r>
+            <a:endParaRPr lang="nl-NL" sz="1000" dirty="0"/>
+          </a:p>
+        </p:txBody>
+      </p:sp>
+      <p:cxnSp>
+        <p:nvCxnSpPr>
+          <p:cNvPr id="64" name="Rechte verbindingslijn met pijl 63"/>
+          <p:cNvCxnSpPr>
+            <a:stCxn id="62" idx="4"/>
+            <a:endCxn id="76" idx="0"/>
+          </p:cNvCxnSpPr>
+          <p:nvPr/>
+        </p:nvCxnSpPr>
+        <p:spPr>
+          <a:xfrm>
+            <a:off x="6694356" y="3314202"/>
+            <a:ext cx="9004" cy="1325657"/>
+          </a:xfrm>
+          <a:prstGeom prst="straightConnector1">
+            <a:avLst/>
+          </a:prstGeom>
+          <a:ln w="19050">
+            <a:tailEnd type="triangle"/>
+          </a:ln>
+        </p:spPr>
+        <p:style>
+          <a:lnRef idx="1">
+            <a:schemeClr val="accent1"/>
+          </a:lnRef>
+          <a:fillRef idx="0">
+            <a:schemeClr val="accent1"/>
+          </a:fillRef>
+          <a:effectRef idx="0">
+            <a:schemeClr val="accent1"/>
+          </a:effectRef>
+          <a:fontRef idx="minor">
+            <a:schemeClr val="tx1"/>
+          </a:fontRef>
+        </p:style>
+      </p:cxnSp>
+      <p:sp>
+        <p:nvSpPr>
+          <p:cNvPr id="67" name="Tekstvak 66"/>
+          <p:cNvSpPr txBox="1"/>
+          <p:nvPr/>
+        </p:nvSpPr>
+        <p:spPr>
+          <a:xfrm>
+            <a:off x="4337238" y="5030455"/>
+            <a:ext cx="904415" cy="246221"/>
+          </a:xfrm>
+          <a:prstGeom prst="rect">
+            <a:avLst/>
+          </a:prstGeom>
+          <a:noFill/>
+        </p:spPr>
+        <p:txBody>
+          <a:bodyPr wrap="none" rtlCol="0">
+            <a:spAutoFit/>
+          </a:bodyPr>
+          <a:lstStyle/>
+          <a:p>
+            <a:r>
+              <a:rPr lang="nl-NL" sz="1000" dirty="0" err="1" smtClean="0"/>
+              <a:t>mcons</a:t>
+            </a:r>
+            <a:r>
+              <a:rPr lang="nl-NL" sz="1000" dirty="0" smtClean="0"/>
+              <a:t> (f (f a))</a:t>
+            </a:r>
+            <a:endParaRPr lang="nl-NL" sz="1000" dirty="0"/>
+          </a:p>
+        </p:txBody>
+      </p:sp>
+      <p:sp>
+        <p:nvSpPr>
+          <p:cNvPr id="71" name="Tekstvak 70"/>
+          <p:cNvSpPr txBox="1"/>
+          <p:nvPr/>
+        </p:nvSpPr>
+        <p:spPr>
+          <a:xfrm>
+            <a:off x="4280110" y="2750920"/>
+            <a:ext cx="223138" cy="246221"/>
+          </a:xfrm>
+          <a:prstGeom prst="rect">
+            <a:avLst/>
+          </a:prstGeom>
+          <a:noFill/>
+        </p:spPr>
+        <p:txBody>
+          <a:bodyPr wrap="none" rtlCol="0">
+            <a:spAutoFit/>
+          </a:bodyPr>
+          <a:lstStyle/>
+          <a:p>
+            <a:r>
+              <a:rPr lang="nl-NL" sz="1000" dirty="0" smtClean="0"/>
+              <a:t>f</a:t>
+            </a:r>
+            <a:endParaRPr lang="nl-NL" sz="1000" dirty="0"/>
+          </a:p>
+        </p:txBody>
+      </p:sp>
+      <p:cxnSp>
+        <p:nvCxnSpPr>
+          <p:cNvPr id="72" name="Rechte verbindingslijn met pijl 71"/>
+          <p:cNvCxnSpPr>
+            <a:stCxn id="58" idx="6"/>
+            <a:endCxn id="62" idx="2"/>
+          </p:cNvCxnSpPr>
+          <p:nvPr/>
+        </p:nvCxnSpPr>
+        <p:spPr>
+          <a:xfrm>
+            <a:off x="5581490" y="3050863"/>
+            <a:ext cx="754683" cy="6486"/>
+          </a:xfrm>
+          <a:prstGeom prst="straightConnector1">
+            <a:avLst/>
+          </a:prstGeom>
+          <a:ln w="19050">
+            <a:tailEnd type="triangle"/>
+          </a:ln>
+        </p:spPr>
+        <p:style>
+          <a:lnRef idx="1">
+            <a:schemeClr val="accent1"/>
+          </a:lnRef>
+          <a:fillRef idx="0">
+            <a:schemeClr val="accent1"/>
+          </a:fillRef>
+          <a:effectRef idx="0">
+            <a:schemeClr val="accent1"/>
+          </a:effectRef>
+          <a:fontRef idx="minor">
+            <a:schemeClr val="tx1"/>
+          </a:fontRef>
+        </p:style>
+      </p:cxnSp>
+      <p:cxnSp>
+        <p:nvCxnSpPr>
+          <p:cNvPr id="74" name="Rechte verbindingslijn met pijl 73"/>
+          <p:cNvCxnSpPr>
+            <a:stCxn id="63" idx="2"/>
+            <a:endCxn id="42" idx="6"/>
+          </p:cNvCxnSpPr>
+          <p:nvPr/>
+        </p:nvCxnSpPr>
+        <p:spPr>
+          <a:xfrm flipH="1">
+            <a:off x="4431257" y="4889169"/>
+            <a:ext cx="594283" cy="7544"/>
+          </a:xfrm>
+          <a:prstGeom prst="straightConnector1">
+            <a:avLst/>
+          </a:prstGeom>
+          <a:ln w="19050">
+            <a:tailEnd type="triangle"/>
+          </a:ln>
+        </p:spPr>
+        <p:style>
+          <a:lnRef idx="1">
+            <a:schemeClr val="accent1"/>
+          </a:lnRef>
+          <a:fillRef idx="0">
+            <a:schemeClr val="accent1"/>
+          </a:fillRef>
+          <a:effectRef idx="0">
+            <a:schemeClr val="accent1"/>
+          </a:effectRef>
+          <a:fontRef idx="minor">
+            <a:schemeClr val="tx1"/>
+          </a:fontRef>
+        </p:style>
+      </p:cxnSp>
+      <p:sp>
+        <p:nvSpPr>
+          <p:cNvPr id="76" name="Ovaal 75"/>
+          <p:cNvSpPr/>
+          <p:nvPr/>
+        </p:nvSpPr>
+        <p:spPr>
+          <a:xfrm>
+            <a:off x="6414538" y="4639859"/>
+            <a:ext cx="577643" cy="513707"/>
+          </a:xfrm>
+          <a:prstGeom prst="ellipse">
+            <a:avLst/>
+          </a:prstGeom>
+        </p:spPr>
+        <p:style>
+          <a:lnRef idx="2">
+            <a:schemeClr val="accent6"/>
+          </a:lnRef>
+          <a:fillRef idx="1">
+            <a:schemeClr val="lt1"/>
+          </a:fillRef>
+          <a:effectRef idx="0">
+            <a:schemeClr val="accent6"/>
+          </a:effectRef>
+          <a:fontRef idx="minor">
+            <a:schemeClr val="dk1"/>
+          </a:fontRef>
+        </p:style>
+        <p:txBody>
+          <a:bodyPr rtlCol="0" anchor="ctr"/>
+          <a:lstStyle/>
+          <a:p>
+            <a:pPr algn="ctr"/>
+            <a:r>
+              <a:rPr lang="nl-NL" sz="1000" dirty="0" smtClean="0"/>
+              <a:t>[]</a:t>
+            </a:r>
+            <a:endParaRPr lang="nl-NL" sz="1000" dirty="0"/>
+          </a:p>
+        </p:txBody>
+      </p:sp>
+      <p:sp>
+        <p:nvSpPr>
+          <p:cNvPr id="58" name="Ovaal 57"/>
+          <p:cNvSpPr/>
+          <p:nvPr/>
+        </p:nvSpPr>
+        <p:spPr>
+          <a:xfrm>
+            <a:off x="5047234" y="2794009"/>
+            <a:ext cx="534256" cy="513707"/>
+          </a:xfrm>
+          <a:prstGeom prst="ellipse">
+            <a:avLst/>
+          </a:prstGeom>
+        </p:spPr>
+        <p:style>
+          <a:lnRef idx="2">
+            <a:schemeClr val="accent6"/>
+          </a:lnRef>
+          <a:fillRef idx="1">
+            <a:schemeClr val="lt1"/>
+          </a:fillRef>
+          <a:effectRef idx="0">
+            <a:schemeClr val="accent6"/>
+          </a:effectRef>
+          <a:fontRef idx="minor">
+            <a:schemeClr val="dk1"/>
+          </a:fontRef>
+        </p:style>
+        <p:txBody>
+          <a:bodyPr lIns="36000" rIns="36000" rtlCol="0" anchor="ctr"/>
+          <a:lstStyle/>
+          <a:p>
+            <a:pPr algn="ctr"/>
+            <a:r>
+              <a:rPr lang="nl-NL" sz="1000" dirty="0"/>
+              <a:t>f</a:t>
+            </a:r>
+            <a:r>
+              <a:rPr lang="nl-NL" sz="1000" dirty="0" smtClean="0"/>
+              <a:t> (f a)</a:t>
+            </a:r>
+            <a:endParaRPr lang="nl-NL" sz="1000" dirty="0"/>
+          </a:p>
+        </p:txBody>
+      </p:sp>
+      <p:cxnSp>
+        <p:nvCxnSpPr>
+          <p:cNvPr id="70" name="Rechte verbindingslijn met pijl 69"/>
+          <p:cNvCxnSpPr>
+            <a:stCxn id="40" idx="6"/>
+            <a:endCxn id="58" idx="2"/>
+          </p:cNvCxnSpPr>
+          <p:nvPr/>
+        </p:nvCxnSpPr>
+        <p:spPr>
+          <a:xfrm flipV="1">
+            <a:off x="4116548" y="3050863"/>
+            <a:ext cx="930686" cy="6486"/>
+          </a:xfrm>
+          <a:prstGeom prst="straightConnector1">
+            <a:avLst/>
+          </a:prstGeom>
+          <a:ln w="19050">
+            <a:tailEnd type="triangle"/>
+          </a:ln>
+        </p:spPr>
+        <p:style>
+          <a:lnRef idx="1">
+            <a:schemeClr val="accent1"/>
+          </a:lnRef>
+          <a:fillRef idx="0">
+            <a:schemeClr val="accent1"/>
+          </a:fillRef>
+          <a:effectRef idx="0">
+            <a:schemeClr val="accent1"/>
+          </a:effectRef>
+          <a:fontRef idx="minor">
+            <a:schemeClr val="tx1"/>
+          </a:fontRef>
+        </p:style>
+      </p:cxnSp>
+      <p:cxnSp>
+        <p:nvCxnSpPr>
+          <p:cNvPr id="75" name="Rechte verbindingslijn met pijl 74"/>
+          <p:cNvCxnSpPr>
+            <a:stCxn id="58" idx="4"/>
+            <a:endCxn id="63" idx="0"/>
+          </p:cNvCxnSpPr>
+          <p:nvPr/>
+        </p:nvCxnSpPr>
+        <p:spPr>
+          <a:xfrm>
+            <a:off x="5314362" y="3307716"/>
+            <a:ext cx="0" cy="1324599"/>
+          </a:xfrm>
+          <a:prstGeom prst="straightConnector1">
+            <a:avLst/>
+          </a:prstGeom>
+          <a:ln w="19050">
+            <a:tailEnd type="triangle"/>
+          </a:ln>
+        </p:spPr>
+        <p:style>
+          <a:lnRef idx="1">
+            <a:schemeClr val="accent1"/>
+          </a:lnRef>
+          <a:fillRef idx="0">
+            <a:schemeClr val="accent1"/>
+          </a:fillRef>
+          <a:effectRef idx="0">
+            <a:schemeClr val="accent1"/>
+          </a:effectRef>
+          <a:fontRef idx="minor">
+            <a:schemeClr val="tx1"/>
+          </a:fontRef>
+        </p:style>
+      </p:cxnSp>
+      <p:cxnSp>
+        <p:nvCxnSpPr>
+          <p:cNvPr id="78" name="Rechte verbindingslijn met pijl 77"/>
+          <p:cNvCxnSpPr>
+            <a:stCxn id="76" idx="2"/>
+            <a:endCxn id="63" idx="6"/>
+          </p:cNvCxnSpPr>
+          <p:nvPr/>
+        </p:nvCxnSpPr>
+        <p:spPr>
+          <a:xfrm flipH="1" flipV="1">
+            <a:off x="5603183" y="4889169"/>
+            <a:ext cx="811355" cy="7544"/>
+          </a:xfrm>
+          <a:prstGeom prst="straightConnector1">
+            <a:avLst/>
+          </a:prstGeom>
+          <a:ln w="19050">
+            <a:tailEnd type="triangle"/>
+          </a:ln>
+        </p:spPr>
+        <p:style>
+          <a:lnRef idx="1">
+            <a:schemeClr val="accent1"/>
+          </a:lnRef>
+          <a:fillRef idx="0">
+            <a:schemeClr val="accent1"/>
+          </a:fillRef>
+          <a:effectRef idx="0">
+            <a:schemeClr val="accent1"/>
+          </a:effectRef>
+          <a:fontRef idx="minor">
+            <a:schemeClr val="tx1"/>
+          </a:fontRef>
+        </p:style>
+      </p:cxnSp>
+      <p:sp>
+        <p:nvSpPr>
+          <p:cNvPr id="79" name="Tekstvak 78"/>
+          <p:cNvSpPr txBox="1"/>
+          <p:nvPr/>
+        </p:nvSpPr>
+        <p:spPr>
+          <a:xfrm>
+            <a:off x="4258329" y="3742415"/>
+            <a:ext cx="1101584" cy="246221"/>
+          </a:xfrm>
+          <a:prstGeom prst="rect">
+            <a:avLst/>
+          </a:prstGeom>
+          <a:noFill/>
+        </p:spPr>
+        <p:txBody>
+          <a:bodyPr wrap="none" rtlCol="0">
+            <a:spAutoFit/>
+          </a:bodyPr>
+          <a:lstStyle/>
+          <a:p>
+            <a:r>
+              <a:rPr lang="nl-NL" sz="1000" dirty="0"/>
+              <a:t>b</a:t>
+            </a:r>
+            <a:r>
+              <a:rPr lang="nl-NL" sz="1000" dirty="0" smtClean="0"/>
+              <a:t>ind (Just (f (f a)))</a:t>
+            </a:r>
+            <a:endParaRPr lang="nl-NL" sz="1000" dirty="0"/>
+          </a:p>
+        </p:txBody>
+      </p:sp>
+      <p:sp>
+        <p:nvSpPr>
+          <p:cNvPr id="82" name="Tekstvak 81"/>
+          <p:cNvSpPr txBox="1"/>
+          <p:nvPr/>
+        </p:nvSpPr>
+        <p:spPr>
+          <a:xfrm>
+            <a:off x="5857850" y="3742415"/>
+            <a:ext cx="862737" cy="246221"/>
+          </a:xfrm>
+          <a:prstGeom prst="rect">
+            <a:avLst/>
+          </a:prstGeom>
+          <a:noFill/>
+        </p:spPr>
+        <p:txBody>
+          <a:bodyPr wrap="none" rtlCol="0">
+            <a:spAutoFit/>
+          </a:bodyPr>
+          <a:lstStyle/>
+          <a:p>
+            <a:r>
+              <a:rPr lang="nl-NL" sz="1000" dirty="0"/>
+              <a:t>b</a:t>
+            </a:r>
+            <a:r>
+              <a:rPr lang="nl-NL" sz="1000" dirty="0" smtClean="0"/>
+              <a:t>ind </a:t>
+            </a:r>
+            <a:r>
+              <a:rPr lang="nl-NL" sz="1000" dirty="0" err="1" smtClean="0"/>
+              <a:t>Nothing</a:t>
+            </a:r>
+            <a:endParaRPr lang="nl-NL" sz="1000" dirty="0"/>
+          </a:p>
+        </p:txBody>
+      </p:sp>
+      <p:sp>
+        <p:nvSpPr>
+          <p:cNvPr id="83" name="Tekstvak 82"/>
+          <p:cNvSpPr txBox="1"/>
+          <p:nvPr/>
+        </p:nvSpPr>
+        <p:spPr>
+          <a:xfrm>
+            <a:off x="5554934" y="5030455"/>
+            <a:ext cx="973343" cy="246221"/>
+          </a:xfrm>
+          <a:prstGeom prst="rect">
+            <a:avLst/>
+          </a:prstGeom>
+          <a:noFill/>
+        </p:spPr>
+        <p:txBody>
+          <a:bodyPr wrap="none" rtlCol="0">
+            <a:spAutoFit/>
+          </a:bodyPr>
+          <a:lstStyle/>
+          <a:p>
+            <a:r>
+              <a:rPr lang="nl-NL" sz="1000" dirty="0" err="1" smtClean="0"/>
+              <a:t>mcons</a:t>
+            </a:r>
+            <a:r>
+              <a:rPr lang="nl-NL" sz="1000" dirty="0" smtClean="0"/>
+              <a:t> </a:t>
+            </a:r>
+            <a:r>
+              <a:rPr lang="nl-NL" sz="1000" dirty="0" err="1" smtClean="0"/>
+              <a:t>Nothing</a:t>
+            </a:r>
+            <a:endParaRPr lang="nl-NL" sz="1000" dirty="0"/>
+          </a:p>
+        </p:txBody>
+      </p:sp>
+      <p:sp>
+        <p:nvSpPr>
+          <p:cNvPr id="85" name="Tekstvak 84"/>
+          <p:cNvSpPr txBox="1"/>
+          <p:nvPr/>
+        </p:nvSpPr>
+        <p:spPr>
+          <a:xfrm>
+            <a:off x="5890884" y="2750920"/>
+            <a:ext cx="223138" cy="246221"/>
+          </a:xfrm>
+          <a:prstGeom prst="rect">
+            <a:avLst/>
+          </a:prstGeom>
+          <a:noFill/>
+        </p:spPr>
+        <p:txBody>
+          <a:bodyPr wrap="none" rtlCol="0">
+            <a:spAutoFit/>
+          </a:bodyPr>
+          <a:lstStyle/>
+          <a:p>
+            <a:r>
+              <a:rPr lang="nl-NL" sz="1000" dirty="0" smtClean="0"/>
+              <a:t>f</a:t>
+            </a:r>
+            <a:endParaRPr lang="nl-NL" sz="1000" dirty="0"/>
+          </a:p>
+        </p:txBody>
+      </p:sp>
+    </p:spTree>
+    <p:extLst>
+      <p:ext uri="{BB962C8B-B14F-4D97-AF65-F5344CB8AC3E}">
+        <p14:creationId xmlns:p14="http://schemas.microsoft.com/office/powerpoint/2010/main" val="1460204984"/>
+      </p:ext>
+    </p:extLst>
+  </p:cSld>
+  <p:clrMapOvr>
+    <a:masterClrMapping/>
+  </p:clrMapOvr>
+</p:sld>
+</file>
+
 <file path=ppt/slides/slide2.xml><?xml version="1.0" encoding="utf-8"?>
 <p:sld xmlns:a="http://schemas.openxmlformats.org/drawingml/2006/main" xmlns:r="http://schemas.openxmlformats.org/officeDocument/2006/relationships" xmlns:p="http://schemas.openxmlformats.org/presentationml/2006/main">
   <p:cSld>
@@ -8335,11 +9344,15 @@
         </p:nvSpPr>
         <p:spPr>
           <a:xfrm rot="1585342">
-            <a:off x="2043601" y="4457208"/>
-            <a:ext cx="712020" cy="426472"/>
+            <a:off x="1808448" y="4574750"/>
+            <a:ext cx="904831" cy="426472"/>
           </a:xfrm>
           <a:prstGeom prst="blockArc">
-            <a:avLst/>
+            <a:avLst>
+              <a:gd name="adj1" fmla="val 12120267"/>
+              <a:gd name="adj2" fmla="val 20443658"/>
+              <a:gd name="adj3" fmla="val 6660"/>
+            </a:avLst>
           </a:prstGeom>
         </p:spPr>
         <p:style>
@@ -8379,7 +9392,7 @@
         </p:nvSpPr>
         <p:spPr>
           <a:xfrm>
-            <a:off x="1303034" y="2999888"/>
+            <a:off x="1863653" y="2557719"/>
             <a:ext cx="245580" cy="246221"/>
           </a:xfrm>
           <a:prstGeom prst="rect">
@@ -8462,7 +9475,7 @@
         </p:nvSpPr>
         <p:spPr>
           <a:xfrm>
-            <a:off x="928726" y="3325668"/>
+            <a:off x="1310734" y="3329281"/>
             <a:ext cx="720069" cy="246221"/>
           </a:xfrm>
           <a:prstGeom prst="rect">
@@ -8572,14 +9585,14 @@
       </p:cxnSp>
       <p:sp>
         <p:nvSpPr>
-          <p:cNvPr id="49" name="Tekstvak 48"/>
+          <p:cNvPr id="50" name="Tekstvak 49"/>
           <p:cNvSpPr txBox="1"/>
           <p:nvPr/>
         </p:nvSpPr>
         <p:spPr>
-          <a:xfrm>
-            <a:off x="2432301" y="4961721"/>
-            <a:ext cx="1040670" cy="246221"/>
+          <a:xfrm rot="1800000">
+            <a:off x="2044787" y="4443858"/>
+            <a:ext cx="973343" cy="246221"/>
           </a:xfrm>
           <a:prstGeom prst="rect">
             <a:avLst/>
@@ -8598,7 +9611,7 @@
             </a:r>
             <a:r>
               <a:rPr lang="nl-NL" sz="1000" dirty="0" smtClean="0"/>
-              <a:t>&lt;$&gt;f a&lt;*&gt;</a:t>
+              <a:t>&lt;$&gt;a&lt;*&gt;</a:t>
             </a:r>
             <a:endParaRPr lang="nl-NL" sz="1000" dirty="0"/>
           </a:p>
@@ -8606,14 +9619,14 @@
       </p:sp>
       <p:sp>
         <p:nvSpPr>
-          <p:cNvPr id="50" name="Tekstvak 49"/>
+          <p:cNvPr id="52" name="Tekstvak 51"/>
           <p:cNvSpPr txBox="1"/>
           <p:nvPr/>
         </p:nvSpPr>
         <p:spPr>
           <a:xfrm>
-            <a:off x="952949" y="4270705"/>
-            <a:ext cx="973343" cy="246221"/>
+            <a:off x="1398782" y="5265043"/>
+            <a:ext cx="1181734" cy="246221"/>
           </a:xfrm>
           <a:prstGeom prst="rect">
             <a:avLst/>
@@ -8626,55 +9639,13 @@
           </a:bodyPr>
           <a:lstStyle/>
           <a:p>
-            <a:r>
-              <a:rPr lang="nl-NL" sz="1000" dirty="0" err="1" smtClean="0"/>
-              <a:t>mcons</a:t>
-            </a:r>
-            <a:r>
-              <a:rPr lang="nl-NL" sz="1000" dirty="0" smtClean="0"/>
-              <a:t>&lt;$&gt;a&lt;*&gt;</a:t>
-            </a:r>
-            <a:endParaRPr lang="nl-NL" sz="1000" dirty="0"/>
-          </a:p>
-        </p:txBody>
-      </p:sp>
-      <p:sp>
-        <p:nvSpPr>
-          <p:cNvPr id="52" name="Tekstvak 51"/>
-          <p:cNvSpPr txBox="1"/>
-          <p:nvPr/>
-        </p:nvSpPr>
-        <p:spPr>
-          <a:xfrm>
-            <a:off x="1398782" y="5251172"/>
-            <a:ext cx="1175322" cy="246221"/>
-          </a:xfrm>
-          <a:prstGeom prst="rect">
-            <a:avLst/>
-          </a:prstGeom>
-          <a:noFill/>
-        </p:spPr>
-        <p:txBody>
-          <a:bodyPr wrap="none" rtlCol="0">
-            <a:spAutoFit/>
-          </a:bodyPr>
-          <a:lstStyle/>
-          <a:p>
-            <a:r>
-              <a:rPr lang="nl-NL" sz="1000" dirty="0" err="1">
-                <a:solidFill>
-                  <a:schemeClr val="accent2"/>
-                </a:solidFill>
-              </a:rPr>
-              <a:t>c</a:t>
-            </a:r>
             <a:r>
               <a:rPr lang="nl-NL" sz="1000" dirty="0" err="1" smtClean="0">
                 <a:solidFill>
                   <a:schemeClr val="accent2"/>
                 </a:solidFill>
               </a:rPr>
-              <a:t>oncat</a:t>
+              <a:t>mcons</a:t>
             </a:r>
             <a:r>
               <a:rPr lang="nl-NL" sz="1000" dirty="0" smtClean="0">
@@ -8682,7 +9653,7 @@
                   <a:schemeClr val="accent2"/>
                 </a:solidFill>
               </a:rPr>
-              <a:t>&lt;$&gt;f a&lt;*&gt;f a</a:t>
+              <a:t>&lt;$&gt;a&lt;*&gt;[f a]</a:t>
             </a:r>
             <a:endParaRPr lang="nl-NL" sz="1000" dirty="0">
               <a:solidFill>
@@ -8824,7 +9795,7 @@
         </p:nvSpPr>
         <p:spPr>
           <a:xfrm>
-            <a:off x="3168454" y="2999887"/>
+            <a:off x="3692966" y="2542302"/>
             <a:ext cx="312906" cy="246221"/>
           </a:xfrm>
           <a:prstGeom prst="rect">
@@ -8920,7 +9891,7 @@
         </p:nvSpPr>
         <p:spPr>
           <a:xfrm>
-            <a:off x="2794146" y="3325667"/>
+            <a:off x="3163736" y="3335469"/>
             <a:ext cx="720069" cy="246221"/>
           </a:xfrm>
           <a:prstGeom prst="rect">
@@ -9028,40 +9999,6 @@
           </a:fontRef>
         </p:style>
       </p:cxnSp>
-      <p:sp>
-        <p:nvSpPr>
-          <p:cNvPr id="58" name="Tekstvak 57"/>
-          <p:cNvSpPr txBox="1"/>
-          <p:nvPr/>
-        </p:nvSpPr>
-        <p:spPr>
-          <a:xfrm>
-            <a:off x="2818369" y="4270704"/>
-            <a:ext cx="1040670" cy="246221"/>
-          </a:xfrm>
-          <a:prstGeom prst="rect">
-            <a:avLst/>
-          </a:prstGeom>
-          <a:noFill/>
-        </p:spPr>
-        <p:txBody>
-          <a:bodyPr wrap="none" rtlCol="0">
-            <a:spAutoFit/>
-          </a:bodyPr>
-          <a:lstStyle/>
-          <a:p>
-            <a:r>
-              <a:rPr lang="nl-NL" sz="1000" dirty="0" err="1" smtClean="0"/>
-              <a:t>mcons</a:t>
-            </a:r>
-            <a:r>
-              <a:rPr lang="nl-NL" sz="1000" dirty="0" smtClean="0"/>
-              <a:t>&lt;$&gt;f a&lt;*&gt;</a:t>
-            </a:r>
-            <a:endParaRPr lang="nl-NL" sz="1000" dirty="0"/>
-          </a:p>
-        </p:txBody>
-      </p:sp>
       <p:cxnSp>
         <p:nvCxnSpPr>
           <p:cNvPr id="59" name="Rechte verbindingslijn met pijl 58"/>
@@ -9292,7 +10229,7 @@
         </p:nvSpPr>
         <p:spPr>
           <a:xfrm>
-            <a:off x="4867257" y="3011935"/>
+            <a:off x="5521499" y="2537435"/>
             <a:ext cx="603050" cy="246221"/>
           </a:xfrm>
           <a:prstGeom prst="rect">
@@ -9380,7 +10317,7 @@
         </p:nvSpPr>
         <p:spPr>
           <a:xfrm>
-            <a:off x="4750238" y="3325667"/>
+            <a:off x="5144372" y="3319246"/>
             <a:ext cx="720069" cy="246221"/>
           </a:xfrm>
           <a:prstGeom prst="rect">
@@ -9498,48 +10435,6 @@
       </p:cxnSp>
       <p:sp>
         <p:nvSpPr>
-          <p:cNvPr id="70" name="Tekstvak 69"/>
-          <p:cNvSpPr txBox="1"/>
-          <p:nvPr/>
-        </p:nvSpPr>
-        <p:spPr>
-          <a:xfrm>
-            <a:off x="4464155" y="4270704"/>
-            <a:ext cx="1350976" cy="246221"/>
-          </a:xfrm>
-          <a:prstGeom prst="rect">
-            <a:avLst/>
-          </a:prstGeom>
-          <a:noFill/>
-        </p:spPr>
-        <p:txBody>
-          <a:bodyPr wrap="square" rtlCol="0">
-            <a:spAutoFit/>
-          </a:bodyPr>
-          <a:lstStyle/>
-          <a:p>
-            <a:r>
-              <a:rPr lang="nl-NL" sz="1000" dirty="0" err="1" smtClean="0"/>
-              <a:t>mcons</a:t>
-            </a:r>
-            <a:r>
-              <a:rPr lang="nl-NL" sz="1000" dirty="0" smtClean="0"/>
-              <a:t>&lt;$&gt;</a:t>
-            </a:r>
-            <a:r>
-              <a:rPr lang="nl-NL" sz="1000" dirty="0" err="1" smtClean="0"/>
-              <a:t>Nothing</a:t>
-            </a:r>
-            <a:r>
-              <a:rPr lang="nl-NL" sz="1000" dirty="0" smtClean="0"/>
-              <a:t>&lt;*&gt;</a:t>
-            </a:r>
-            <a:endParaRPr lang="nl-NL" sz="1000" dirty="0"/>
-          </a:p>
-        </p:txBody>
-      </p:sp>
-      <p:sp>
-        <p:nvSpPr>
           <p:cNvPr id="71" name="Tekstvak 70"/>
           <p:cNvSpPr txBox="1"/>
           <p:nvPr/>
@@ -9610,8 +10505,8 @@
           <p:nvPr/>
         </p:nvSpPr>
         <p:spPr>
-          <a:xfrm>
-            <a:off x="4464154" y="4961720"/>
+          <a:xfrm rot="1800000">
+            <a:off x="3882380" y="4435413"/>
             <a:ext cx="1040670" cy="246221"/>
           </a:xfrm>
           <a:prstGeom prst="rect">
@@ -9681,7 +10576,7 @@
         </p:nvSpPr>
         <p:spPr>
           <a:xfrm>
-            <a:off x="6723274" y="4632315"/>
+            <a:off x="6939174" y="4632315"/>
             <a:ext cx="577643" cy="513707"/>
           </a:xfrm>
           <a:prstGeom prst="ellipse">
@@ -9727,7 +10622,7 @@
         <p:spPr>
           <a:xfrm flipH="1">
             <a:off x="6099142" y="4889169"/>
-            <a:ext cx="624132" cy="0"/>
+            <a:ext cx="840032" cy="0"/>
           </a:xfrm>
           <a:prstGeom prst="straightConnector1">
             <a:avLst/>
@@ -9758,8 +10653,8 @@
           <p:nvPr/>
         </p:nvSpPr>
         <p:spPr>
-          <a:xfrm>
-            <a:off x="5831838" y="5087630"/>
+          <a:xfrm rot="1811402">
+            <a:off x="5737933" y="4461798"/>
             <a:ext cx="1350976" cy="246221"/>
           </a:xfrm>
           <a:prstGeom prst="rect">
@@ -9805,7 +10700,7 @@
         <p:spPr>
           <a:xfrm>
             <a:off x="6054591" y="3238971"/>
-            <a:ext cx="957505" cy="1393344"/>
+            <a:ext cx="1173405" cy="1393344"/>
           </a:xfrm>
           <a:prstGeom prst="straightConnector1">
             <a:avLst/>
@@ -9909,7 +10804,7 @@
         </p:nvSpPr>
         <p:spPr>
           <a:xfrm>
-            <a:off x="2530600" y="3593662"/>
+            <a:off x="2575050" y="3619062"/>
             <a:ext cx="771365" cy="246221"/>
           </a:xfrm>
           <a:prstGeom prst="rect">
@@ -9943,7 +10838,7 @@
         </p:nvSpPr>
         <p:spPr>
           <a:xfrm>
-            <a:off x="4553848" y="3573521"/>
+            <a:off x="4528448" y="3598921"/>
             <a:ext cx="838691" cy="246221"/>
           </a:xfrm>
           <a:prstGeom prst="rect">
@@ -9981,7 +10876,7 @@
         </p:nvSpPr>
         <p:spPr>
           <a:xfrm>
-            <a:off x="6296332" y="3596758"/>
+            <a:off x="6442382" y="3622158"/>
             <a:ext cx="1128835" cy="246221"/>
           </a:xfrm>
           <a:prstGeom prst="rect">
@@ -10008,6 +10903,248 @@
               <a:t>recur</a:t>
             </a:r>
             <a:endParaRPr lang="nl-NL" sz="1000" dirty="0"/>
+          </a:p>
+        </p:txBody>
+      </p:sp>
+      <p:sp>
+        <p:nvSpPr>
+          <p:cNvPr id="121" name="Blokboog 120"/>
+          <p:cNvSpPr/>
+          <p:nvPr/>
+        </p:nvSpPr>
+        <p:spPr>
+          <a:xfrm rot="1585342">
+            <a:off x="3676431" y="4566861"/>
+            <a:ext cx="904831" cy="426472"/>
+          </a:xfrm>
+          <a:prstGeom prst="blockArc">
+            <a:avLst>
+              <a:gd name="adj1" fmla="val 12120267"/>
+              <a:gd name="adj2" fmla="val 20443658"/>
+              <a:gd name="adj3" fmla="val 6660"/>
+            </a:avLst>
+          </a:prstGeom>
+        </p:spPr>
+        <p:style>
+          <a:lnRef idx="2">
+            <a:schemeClr val="accent1">
+              <a:shade val="50000"/>
+            </a:schemeClr>
+          </a:lnRef>
+          <a:fillRef idx="1">
+            <a:schemeClr val="accent1"/>
+          </a:fillRef>
+          <a:effectRef idx="0">
+            <a:schemeClr val="accent1"/>
+          </a:effectRef>
+          <a:fontRef idx="minor">
+            <a:schemeClr val="lt1"/>
+          </a:fontRef>
+        </p:style>
+        <p:txBody>
+          <a:bodyPr rtlCol="0" anchor="ctr"/>
+          <a:lstStyle/>
+          <a:p>
+            <a:pPr algn="ctr"/>
+            <a:endParaRPr lang="nl-NL">
+              <a:solidFill>
+                <a:schemeClr val="tx1"/>
+              </a:solidFill>
+            </a:endParaRPr>
+          </a:p>
+        </p:txBody>
+      </p:sp>
+      <p:sp>
+        <p:nvSpPr>
+          <p:cNvPr id="122" name="Blokboog 121"/>
+          <p:cNvSpPr/>
+          <p:nvPr/>
+        </p:nvSpPr>
+        <p:spPr>
+          <a:xfrm rot="1585342">
+            <a:off x="5652713" y="4592333"/>
+            <a:ext cx="904831" cy="426472"/>
+          </a:xfrm>
+          <a:prstGeom prst="blockArc">
+            <a:avLst>
+              <a:gd name="adj1" fmla="val 12120267"/>
+              <a:gd name="adj2" fmla="val 20443658"/>
+              <a:gd name="adj3" fmla="val 6660"/>
+            </a:avLst>
+          </a:prstGeom>
+        </p:spPr>
+        <p:style>
+          <a:lnRef idx="2">
+            <a:schemeClr val="accent1">
+              <a:shade val="50000"/>
+            </a:schemeClr>
+          </a:lnRef>
+          <a:fillRef idx="1">
+            <a:schemeClr val="accent1"/>
+          </a:fillRef>
+          <a:effectRef idx="0">
+            <a:schemeClr val="accent1"/>
+          </a:effectRef>
+          <a:fontRef idx="minor">
+            <a:schemeClr val="lt1"/>
+          </a:fontRef>
+        </p:style>
+        <p:txBody>
+          <a:bodyPr rtlCol="0" anchor="ctr"/>
+          <a:lstStyle/>
+          <a:p>
+            <a:pPr algn="ctr"/>
+            <a:endParaRPr lang="nl-NL">
+              <a:solidFill>
+                <a:schemeClr val="tx1"/>
+              </a:solidFill>
+            </a:endParaRPr>
+          </a:p>
+        </p:txBody>
+      </p:sp>
+      <p:sp>
+        <p:nvSpPr>
+          <p:cNvPr id="123" name="Tekstvak 122"/>
+          <p:cNvSpPr txBox="1"/>
+          <p:nvPr/>
+        </p:nvSpPr>
+        <p:spPr>
+          <a:xfrm>
+            <a:off x="3289009" y="5251172"/>
+            <a:ext cx="1120820" cy="246221"/>
+          </a:xfrm>
+          <a:prstGeom prst="rect">
+            <a:avLst/>
+          </a:prstGeom>
+          <a:noFill/>
+        </p:spPr>
+        <p:txBody>
+          <a:bodyPr wrap="none" rtlCol="0">
+            <a:spAutoFit/>
+          </a:bodyPr>
+          <a:lstStyle/>
+          <a:p>
+            <a:r>
+              <a:rPr lang="nl-NL" sz="1000" dirty="0" err="1" smtClean="0">
+                <a:solidFill>
+                  <a:schemeClr val="accent2"/>
+                </a:solidFill>
+              </a:rPr>
+              <a:t>mcons</a:t>
+            </a:r>
+            <a:r>
+              <a:rPr lang="nl-NL" sz="1000" dirty="0" smtClean="0">
+                <a:solidFill>
+                  <a:schemeClr val="accent2"/>
+                </a:solidFill>
+              </a:rPr>
+              <a:t>&lt;$&gt;f a&lt;*&gt;[]</a:t>
+            </a:r>
+            <a:endParaRPr lang="nl-NL" sz="1000" dirty="0">
+              <a:solidFill>
+                <a:schemeClr val="accent2"/>
+              </a:solidFill>
+            </a:endParaRPr>
+          </a:p>
+        </p:txBody>
+      </p:sp>
+      <p:sp>
+        <p:nvSpPr>
+          <p:cNvPr id="124" name="Tekstvak 123"/>
+          <p:cNvSpPr txBox="1"/>
+          <p:nvPr/>
+        </p:nvSpPr>
+        <p:spPr>
+          <a:xfrm>
+            <a:off x="5095835" y="5241936"/>
+            <a:ext cx="1410964" cy="246221"/>
+          </a:xfrm>
+          <a:prstGeom prst="rect">
+            <a:avLst/>
+          </a:prstGeom>
+          <a:noFill/>
+        </p:spPr>
+        <p:txBody>
+          <a:bodyPr wrap="none" rtlCol="0">
+            <a:spAutoFit/>
+          </a:bodyPr>
+          <a:lstStyle/>
+          <a:p>
+            <a:r>
+              <a:rPr lang="nl-NL" sz="1000" dirty="0" err="1" smtClean="0">
+                <a:solidFill>
+                  <a:schemeClr val="accent2"/>
+                </a:solidFill>
+              </a:rPr>
+              <a:t>mcons</a:t>
+            </a:r>
+            <a:r>
+              <a:rPr lang="nl-NL" sz="1000" dirty="0" smtClean="0">
+                <a:solidFill>
+                  <a:schemeClr val="accent2"/>
+                </a:solidFill>
+              </a:rPr>
+              <a:t>&lt;$&gt;</a:t>
+            </a:r>
+            <a:r>
+              <a:rPr lang="nl-NL" sz="1000" dirty="0" err="1" smtClean="0">
+                <a:solidFill>
+                  <a:schemeClr val="accent2"/>
+                </a:solidFill>
+              </a:rPr>
+              <a:t>Nothing</a:t>
+            </a:r>
+            <a:r>
+              <a:rPr lang="nl-NL" sz="1000" dirty="0" smtClean="0">
+                <a:solidFill>
+                  <a:schemeClr val="accent2"/>
+                </a:solidFill>
+              </a:rPr>
+              <a:t>&lt;*&gt;[]</a:t>
+            </a:r>
+            <a:endParaRPr lang="nl-NL" sz="1000" dirty="0">
+              <a:solidFill>
+                <a:schemeClr val="accent2"/>
+              </a:solidFill>
+            </a:endParaRPr>
+          </a:p>
+        </p:txBody>
+      </p:sp>
+      <p:sp>
+        <p:nvSpPr>
+          <p:cNvPr id="125" name="Tekstvak 124"/>
+          <p:cNvSpPr txBox="1"/>
+          <p:nvPr/>
+        </p:nvSpPr>
+        <p:spPr>
+          <a:xfrm>
+            <a:off x="6926470" y="5241935"/>
+            <a:ext cx="603050" cy="246221"/>
+          </a:xfrm>
+          <a:prstGeom prst="rect">
+            <a:avLst/>
+          </a:prstGeom>
+          <a:noFill/>
+        </p:spPr>
+        <p:txBody>
+          <a:bodyPr wrap="none" rtlCol="0">
+            <a:spAutoFit/>
+          </a:bodyPr>
+          <a:lstStyle/>
+          <a:p>
+            <a:r>
+              <a:rPr lang="nl-NL" sz="1000" smtClean="0">
+                <a:solidFill>
+                  <a:schemeClr val="accent2"/>
+                </a:solidFill>
+              </a:rPr>
+              <a:t>Nothing</a:t>
+            </a:r>
+            <a:endParaRPr lang="nl-NL" sz="1000" dirty="0">
+              <a:solidFill>
+                <a:schemeClr val="accent2"/>
+              </a:solidFill>
+            </a:endParaRPr>
           </a:p>
         </p:txBody>
       </p:sp>

</xml_diff>